<commit_message>
dependency graph and docs
</commit_message>
<xml_diff>
--- a/Documentation/DWH_arch.pptx
+++ b/Documentation/DWH_arch.pptx
@@ -111,6 +111,22 @@
       </a:defRPr>
     </a:lvl9pPr>
   </p:defaultTextStyle>
+  <p:extLst>
+    <p:ext uri="{EFAFB233-063F-42B5-8137-9DF3F51BA10A}">
+      <p15:sldGuideLst xmlns:p15="http://schemas.microsoft.com/office/powerpoint/2012/main">
+        <p15:guide id="1" orient="horz" pos="2160">
+          <p15:clr>
+            <a:srgbClr val="A4A3A4"/>
+          </p15:clr>
+        </p15:guide>
+        <p15:guide id="2" pos="3840">
+          <p15:clr>
+            <a:srgbClr val="A4A3A4"/>
+          </p15:clr>
+        </p15:guide>
+      </p15:sldGuideLst>
+    </p:ext>
+  </p:extLst>
 </p:presentation>
 </file>
 
@@ -197,7 +213,7 @@
             <a:fld id="{6C9C9218-A1A0-47D2-934E-A4D5AC48A8E1}" type="datetimeFigureOut">
               <a:rPr lang="nl-NL" smtClean="0"/>
               <a:pPr/>
-              <a:t>12-9-2017</a:t>
+              <a:t>19-12-2018</a:t>
             </a:fld>
             <a:endParaRPr lang="nl-NL"/>
           </a:p>
@@ -261,38 +277,37 @@
           <a:p>
             <a:pPr lvl="0"/>
             <a:r>
-              <a:rPr lang="nl-NL" smtClean="0"/>
+              <a:rPr lang="nl-NL"/>
               <a:t>Klik om de modelstijlen te bewerken</a:t>
             </a:r>
           </a:p>
           <a:p>
             <a:pPr lvl="1"/>
             <a:r>
-              <a:rPr lang="nl-NL" smtClean="0"/>
+              <a:rPr lang="nl-NL"/>
               <a:t>Tweede niveau</a:t>
             </a:r>
           </a:p>
           <a:p>
             <a:pPr lvl="2"/>
             <a:r>
-              <a:rPr lang="nl-NL" smtClean="0"/>
+              <a:rPr lang="nl-NL"/>
               <a:t>Derde niveau</a:t>
             </a:r>
           </a:p>
           <a:p>
             <a:pPr lvl="3"/>
             <a:r>
-              <a:rPr lang="nl-NL" smtClean="0"/>
+              <a:rPr lang="nl-NL"/>
               <a:t>Vierde niveau</a:t>
             </a:r>
           </a:p>
           <a:p>
             <a:pPr lvl="4"/>
             <a:r>
-              <a:rPr lang="nl-NL" smtClean="0"/>
+              <a:rPr lang="nl-NL"/>
               <a:t>Vijfde niveau</a:t>
             </a:r>
-            <a:endParaRPr lang="nl-NL"/>
           </a:p>
         </p:txBody>
       </p:sp>
@@ -357,7 +372,7 @@
             <a:fld id="{5B923E06-4AEE-46A8-8C49-925BBCBEA1C4}" type="slidenum">
               <a:rPr lang="nl-NL" smtClean="0"/>
               <a:pPr/>
-              <a:t>‹nr.›</a:t>
+              <a:t>‹#›</a:t>
             </a:fld>
             <a:endParaRPr lang="nl-NL"/>
           </a:p>
@@ -366,7 +381,7 @@
     </p:spTree>
     <p:extLst>
       <p:ext uri="{BB962C8B-B14F-4D97-AF65-F5344CB8AC3E}">
-        <p14:creationId xmlns:p14="http://schemas.microsoft.com/office/powerpoint/2010/main" xmlns="" val="3316072252"/>
+        <p14:creationId xmlns:p14="http://schemas.microsoft.com/office/powerpoint/2010/main" val="3316072252"/>
       </p:ext>
     </p:extLst>
   </p:cSld>
@@ -541,7 +556,7 @@
     </p:spTree>
     <p:extLst>
       <p:ext uri="{BB962C8B-B14F-4D97-AF65-F5344CB8AC3E}">
-        <p14:creationId xmlns:p14="http://schemas.microsoft.com/office/powerpoint/2010/main" xmlns="" val="1261652413"/>
+        <p14:creationId xmlns:p14="http://schemas.microsoft.com/office/powerpoint/2010/main" val="1261652413"/>
       </p:ext>
     </p:extLst>
   </p:cSld>
@@ -593,10 +608,9 @@
           </a:lstStyle>
           <a:p>
             <a:r>
-              <a:rPr lang="nl-NL" smtClean="0"/>
+              <a:rPr lang="nl-NL"/>
               <a:t>Klik om de stijl te bewerken</a:t>
             </a:r>
-            <a:endParaRPr lang="nl-NL"/>
           </a:p>
         </p:txBody>
       </p:sp>
@@ -658,10 +672,9 @@
           </a:lstStyle>
           <a:p>
             <a:r>
-              <a:rPr lang="nl-NL" smtClean="0"/>
+              <a:rPr lang="nl-NL"/>
               <a:t>Klik om de ondertitelstijl van het model te bewerken</a:t>
             </a:r>
-            <a:endParaRPr lang="nl-NL"/>
           </a:p>
         </p:txBody>
       </p:sp>
@@ -683,7 +696,7 @@
             <a:fld id="{A9D322C4-046F-4F91-8070-474DE20EE4DC}" type="datetimeFigureOut">
               <a:rPr lang="nl-NL" smtClean="0"/>
               <a:pPr/>
-              <a:t>12-9-2017</a:t>
+              <a:t>19-12-2018</a:t>
             </a:fld>
             <a:endParaRPr lang="nl-NL"/>
           </a:p>
@@ -726,7 +739,7 @@
             <a:fld id="{9748A9C7-2C1B-43BA-9461-C5375C79E14F}" type="slidenum">
               <a:rPr lang="nl-NL" smtClean="0"/>
               <a:pPr/>
-              <a:t>‹nr.›</a:t>
+              <a:t>‹#›</a:t>
             </a:fld>
             <a:endParaRPr lang="nl-NL"/>
           </a:p>
@@ -735,7 +748,7 @@
     </p:spTree>
     <p:extLst>
       <p:ext uri="{BB962C8B-B14F-4D97-AF65-F5344CB8AC3E}">
-        <p14:creationId xmlns:p14="http://schemas.microsoft.com/office/powerpoint/2010/main" xmlns="" val="3935716332"/>
+        <p14:creationId xmlns:p14="http://schemas.microsoft.com/office/powerpoint/2010/main" val="3935716332"/>
       </p:ext>
     </p:extLst>
   </p:cSld>
@@ -778,10 +791,9 @@
           <a:lstStyle/>
           <a:p>
             <a:r>
-              <a:rPr lang="nl-NL" smtClean="0"/>
+              <a:rPr lang="nl-NL"/>
               <a:t>Klik om de stijl te bewerken</a:t>
             </a:r>
-            <a:endParaRPr lang="nl-NL"/>
           </a:p>
         </p:txBody>
       </p:sp>
@@ -802,38 +814,37 @@
           <a:p>
             <a:pPr lvl="0"/>
             <a:r>
-              <a:rPr lang="nl-NL" smtClean="0"/>
+              <a:rPr lang="nl-NL"/>
               <a:t>Klik om de modelstijlen te bewerken</a:t>
             </a:r>
           </a:p>
           <a:p>
             <a:pPr lvl="1"/>
             <a:r>
-              <a:rPr lang="nl-NL" smtClean="0"/>
+              <a:rPr lang="nl-NL"/>
               <a:t>Tweede niveau</a:t>
             </a:r>
           </a:p>
           <a:p>
             <a:pPr lvl="2"/>
             <a:r>
-              <a:rPr lang="nl-NL" smtClean="0"/>
+              <a:rPr lang="nl-NL"/>
               <a:t>Derde niveau</a:t>
             </a:r>
           </a:p>
           <a:p>
             <a:pPr lvl="3"/>
             <a:r>
-              <a:rPr lang="nl-NL" smtClean="0"/>
+              <a:rPr lang="nl-NL"/>
               <a:t>Vierde niveau</a:t>
             </a:r>
           </a:p>
           <a:p>
             <a:pPr lvl="4"/>
             <a:r>
-              <a:rPr lang="nl-NL" smtClean="0"/>
+              <a:rPr lang="nl-NL"/>
               <a:t>Vijfde niveau</a:t>
             </a:r>
-            <a:endParaRPr lang="nl-NL"/>
           </a:p>
         </p:txBody>
       </p:sp>
@@ -855,7 +866,7 @@
             <a:fld id="{A9D322C4-046F-4F91-8070-474DE20EE4DC}" type="datetimeFigureOut">
               <a:rPr lang="nl-NL" smtClean="0"/>
               <a:pPr/>
-              <a:t>12-9-2017</a:t>
+              <a:t>19-12-2018</a:t>
             </a:fld>
             <a:endParaRPr lang="nl-NL"/>
           </a:p>
@@ -898,7 +909,7 @@
             <a:fld id="{9748A9C7-2C1B-43BA-9461-C5375C79E14F}" type="slidenum">
               <a:rPr lang="nl-NL" smtClean="0"/>
               <a:pPr/>
-              <a:t>‹nr.›</a:t>
+              <a:t>‹#›</a:t>
             </a:fld>
             <a:endParaRPr lang="nl-NL"/>
           </a:p>
@@ -907,7 +918,7 @@
     </p:spTree>
     <p:extLst>
       <p:ext uri="{BB962C8B-B14F-4D97-AF65-F5344CB8AC3E}">
-        <p14:creationId xmlns:p14="http://schemas.microsoft.com/office/powerpoint/2010/main" xmlns="" val="4119232502"/>
+        <p14:creationId xmlns:p14="http://schemas.microsoft.com/office/powerpoint/2010/main" val="4119232502"/>
       </p:ext>
     </p:extLst>
   </p:cSld>
@@ -955,10 +966,9 @@
           <a:lstStyle/>
           <a:p>
             <a:r>
-              <a:rPr lang="nl-NL" smtClean="0"/>
+              <a:rPr lang="nl-NL"/>
               <a:t>Klik om de stijl te bewerken</a:t>
             </a:r>
-            <a:endParaRPr lang="nl-NL"/>
           </a:p>
         </p:txBody>
       </p:sp>
@@ -984,38 +994,37 @@
           <a:p>
             <a:pPr lvl="0"/>
             <a:r>
-              <a:rPr lang="nl-NL" smtClean="0"/>
+              <a:rPr lang="nl-NL"/>
               <a:t>Klik om de modelstijlen te bewerken</a:t>
             </a:r>
           </a:p>
           <a:p>
             <a:pPr lvl="1"/>
             <a:r>
-              <a:rPr lang="nl-NL" smtClean="0"/>
+              <a:rPr lang="nl-NL"/>
               <a:t>Tweede niveau</a:t>
             </a:r>
           </a:p>
           <a:p>
             <a:pPr lvl="2"/>
             <a:r>
-              <a:rPr lang="nl-NL" smtClean="0"/>
+              <a:rPr lang="nl-NL"/>
               <a:t>Derde niveau</a:t>
             </a:r>
           </a:p>
           <a:p>
             <a:pPr lvl="3"/>
             <a:r>
-              <a:rPr lang="nl-NL" smtClean="0"/>
+              <a:rPr lang="nl-NL"/>
               <a:t>Vierde niveau</a:t>
             </a:r>
           </a:p>
           <a:p>
             <a:pPr lvl="4"/>
             <a:r>
-              <a:rPr lang="nl-NL" smtClean="0"/>
+              <a:rPr lang="nl-NL"/>
               <a:t>Vijfde niveau</a:t>
             </a:r>
-            <a:endParaRPr lang="nl-NL"/>
           </a:p>
         </p:txBody>
       </p:sp>
@@ -1037,7 +1046,7 @@
             <a:fld id="{A9D322C4-046F-4F91-8070-474DE20EE4DC}" type="datetimeFigureOut">
               <a:rPr lang="nl-NL" smtClean="0"/>
               <a:pPr/>
-              <a:t>12-9-2017</a:t>
+              <a:t>19-12-2018</a:t>
             </a:fld>
             <a:endParaRPr lang="nl-NL"/>
           </a:p>
@@ -1080,7 +1089,7 @@
             <a:fld id="{9748A9C7-2C1B-43BA-9461-C5375C79E14F}" type="slidenum">
               <a:rPr lang="nl-NL" smtClean="0"/>
               <a:pPr/>
-              <a:t>‹nr.›</a:t>
+              <a:t>‹#›</a:t>
             </a:fld>
             <a:endParaRPr lang="nl-NL"/>
           </a:p>
@@ -1089,7 +1098,7 @@
     </p:spTree>
     <p:extLst>
       <p:ext uri="{BB962C8B-B14F-4D97-AF65-F5344CB8AC3E}">
-        <p14:creationId xmlns:p14="http://schemas.microsoft.com/office/powerpoint/2010/main" xmlns="" val="2130775980"/>
+        <p14:creationId xmlns:p14="http://schemas.microsoft.com/office/powerpoint/2010/main" val="2130775980"/>
       </p:ext>
     </p:extLst>
   </p:cSld>
@@ -1132,10 +1141,9 @@
           <a:lstStyle/>
           <a:p>
             <a:r>
-              <a:rPr lang="nl-NL" smtClean="0"/>
+              <a:rPr lang="nl-NL"/>
               <a:t>Klik om de stijl te bewerken</a:t>
             </a:r>
-            <a:endParaRPr lang="nl-NL"/>
           </a:p>
         </p:txBody>
       </p:sp>
@@ -1156,38 +1164,37 @@
           <a:p>
             <a:pPr lvl="0"/>
             <a:r>
-              <a:rPr lang="nl-NL" smtClean="0"/>
+              <a:rPr lang="nl-NL"/>
               <a:t>Klik om de modelstijlen te bewerken</a:t>
             </a:r>
           </a:p>
           <a:p>
             <a:pPr lvl="1"/>
             <a:r>
-              <a:rPr lang="nl-NL" smtClean="0"/>
+              <a:rPr lang="nl-NL"/>
               <a:t>Tweede niveau</a:t>
             </a:r>
           </a:p>
           <a:p>
             <a:pPr lvl="2"/>
             <a:r>
-              <a:rPr lang="nl-NL" smtClean="0"/>
+              <a:rPr lang="nl-NL"/>
               <a:t>Derde niveau</a:t>
             </a:r>
           </a:p>
           <a:p>
             <a:pPr lvl="3"/>
             <a:r>
-              <a:rPr lang="nl-NL" smtClean="0"/>
+              <a:rPr lang="nl-NL"/>
               <a:t>Vierde niveau</a:t>
             </a:r>
           </a:p>
           <a:p>
             <a:pPr lvl="4"/>
             <a:r>
-              <a:rPr lang="nl-NL" smtClean="0"/>
+              <a:rPr lang="nl-NL"/>
               <a:t>Vijfde niveau</a:t>
             </a:r>
-            <a:endParaRPr lang="nl-NL"/>
           </a:p>
         </p:txBody>
       </p:sp>
@@ -1209,7 +1216,7 @@
             <a:fld id="{A9D322C4-046F-4F91-8070-474DE20EE4DC}" type="datetimeFigureOut">
               <a:rPr lang="nl-NL" smtClean="0"/>
               <a:pPr/>
-              <a:t>12-9-2017</a:t>
+              <a:t>19-12-2018</a:t>
             </a:fld>
             <a:endParaRPr lang="nl-NL"/>
           </a:p>
@@ -1252,7 +1259,7 @@
             <a:fld id="{9748A9C7-2C1B-43BA-9461-C5375C79E14F}" type="slidenum">
               <a:rPr lang="nl-NL" smtClean="0"/>
               <a:pPr/>
-              <a:t>‹nr.›</a:t>
+              <a:t>‹#›</a:t>
             </a:fld>
             <a:endParaRPr lang="nl-NL"/>
           </a:p>
@@ -1261,7 +1268,7 @@
     </p:spTree>
     <p:extLst>
       <p:ext uri="{BB962C8B-B14F-4D97-AF65-F5344CB8AC3E}">
-        <p14:creationId xmlns:p14="http://schemas.microsoft.com/office/powerpoint/2010/main" xmlns="" val="2725417186"/>
+        <p14:creationId xmlns:p14="http://schemas.microsoft.com/office/powerpoint/2010/main" val="2725417186"/>
       </p:ext>
     </p:extLst>
   </p:cSld>
@@ -1313,10 +1320,9 @@
           </a:lstStyle>
           <a:p>
             <a:r>
-              <a:rPr lang="nl-NL" smtClean="0"/>
+              <a:rPr lang="nl-NL"/>
               <a:t>Klik om de stijl te bewerken</a:t>
             </a:r>
-            <a:endParaRPr lang="nl-NL"/>
           </a:p>
         </p:txBody>
       </p:sp>
@@ -1433,7 +1439,7 @@
           <a:p>
             <a:pPr lvl="0"/>
             <a:r>
-              <a:rPr lang="nl-NL" smtClean="0"/>
+              <a:rPr lang="nl-NL"/>
               <a:t>Klik om de modelstijlen te bewerken</a:t>
             </a:r>
           </a:p>
@@ -1457,7 +1463,7 @@
             <a:fld id="{A9D322C4-046F-4F91-8070-474DE20EE4DC}" type="datetimeFigureOut">
               <a:rPr lang="nl-NL" smtClean="0"/>
               <a:pPr/>
-              <a:t>12-9-2017</a:t>
+              <a:t>19-12-2018</a:t>
             </a:fld>
             <a:endParaRPr lang="nl-NL"/>
           </a:p>
@@ -1500,7 +1506,7 @@
             <a:fld id="{9748A9C7-2C1B-43BA-9461-C5375C79E14F}" type="slidenum">
               <a:rPr lang="nl-NL" smtClean="0"/>
               <a:pPr/>
-              <a:t>‹nr.›</a:t>
+              <a:t>‹#›</a:t>
             </a:fld>
             <a:endParaRPr lang="nl-NL"/>
           </a:p>
@@ -1509,7 +1515,7 @@
     </p:spTree>
     <p:extLst>
       <p:ext uri="{BB962C8B-B14F-4D97-AF65-F5344CB8AC3E}">
-        <p14:creationId xmlns:p14="http://schemas.microsoft.com/office/powerpoint/2010/main" xmlns="" val="714474957"/>
+        <p14:creationId xmlns:p14="http://schemas.microsoft.com/office/powerpoint/2010/main" val="714474957"/>
       </p:ext>
     </p:extLst>
   </p:cSld>
@@ -1552,10 +1558,9 @@
           <a:lstStyle/>
           <a:p>
             <a:r>
-              <a:rPr lang="nl-NL" smtClean="0"/>
+              <a:rPr lang="nl-NL"/>
               <a:t>Klik om de stijl te bewerken</a:t>
             </a:r>
-            <a:endParaRPr lang="nl-NL"/>
           </a:p>
         </p:txBody>
       </p:sp>
@@ -1581,38 +1586,37 @@
           <a:p>
             <a:pPr lvl="0"/>
             <a:r>
-              <a:rPr lang="nl-NL" smtClean="0"/>
+              <a:rPr lang="nl-NL"/>
               <a:t>Klik om de modelstijlen te bewerken</a:t>
             </a:r>
           </a:p>
           <a:p>
             <a:pPr lvl="1"/>
             <a:r>
-              <a:rPr lang="nl-NL" smtClean="0"/>
+              <a:rPr lang="nl-NL"/>
               <a:t>Tweede niveau</a:t>
             </a:r>
           </a:p>
           <a:p>
             <a:pPr lvl="2"/>
             <a:r>
-              <a:rPr lang="nl-NL" smtClean="0"/>
+              <a:rPr lang="nl-NL"/>
               <a:t>Derde niveau</a:t>
             </a:r>
           </a:p>
           <a:p>
             <a:pPr lvl="3"/>
             <a:r>
-              <a:rPr lang="nl-NL" smtClean="0"/>
+              <a:rPr lang="nl-NL"/>
               <a:t>Vierde niveau</a:t>
             </a:r>
           </a:p>
           <a:p>
             <a:pPr lvl="4"/>
             <a:r>
-              <a:rPr lang="nl-NL" smtClean="0"/>
+              <a:rPr lang="nl-NL"/>
               <a:t>Vijfde niveau</a:t>
             </a:r>
-            <a:endParaRPr lang="nl-NL"/>
           </a:p>
         </p:txBody>
       </p:sp>
@@ -1638,38 +1642,37 @@
           <a:p>
             <a:pPr lvl="0"/>
             <a:r>
-              <a:rPr lang="nl-NL" smtClean="0"/>
+              <a:rPr lang="nl-NL"/>
               <a:t>Klik om de modelstijlen te bewerken</a:t>
             </a:r>
           </a:p>
           <a:p>
             <a:pPr lvl="1"/>
             <a:r>
-              <a:rPr lang="nl-NL" smtClean="0"/>
+              <a:rPr lang="nl-NL"/>
               <a:t>Tweede niveau</a:t>
             </a:r>
           </a:p>
           <a:p>
             <a:pPr lvl="2"/>
             <a:r>
-              <a:rPr lang="nl-NL" smtClean="0"/>
+              <a:rPr lang="nl-NL"/>
               <a:t>Derde niveau</a:t>
             </a:r>
           </a:p>
           <a:p>
             <a:pPr lvl="3"/>
             <a:r>
-              <a:rPr lang="nl-NL" smtClean="0"/>
+              <a:rPr lang="nl-NL"/>
               <a:t>Vierde niveau</a:t>
             </a:r>
           </a:p>
           <a:p>
             <a:pPr lvl="4"/>
             <a:r>
-              <a:rPr lang="nl-NL" smtClean="0"/>
+              <a:rPr lang="nl-NL"/>
               <a:t>Vijfde niveau</a:t>
             </a:r>
-            <a:endParaRPr lang="nl-NL"/>
           </a:p>
         </p:txBody>
       </p:sp>
@@ -1691,7 +1694,7 @@
             <a:fld id="{A9D322C4-046F-4F91-8070-474DE20EE4DC}" type="datetimeFigureOut">
               <a:rPr lang="nl-NL" smtClean="0"/>
               <a:pPr/>
-              <a:t>12-9-2017</a:t>
+              <a:t>19-12-2018</a:t>
             </a:fld>
             <a:endParaRPr lang="nl-NL"/>
           </a:p>
@@ -1734,7 +1737,7 @@
             <a:fld id="{9748A9C7-2C1B-43BA-9461-C5375C79E14F}" type="slidenum">
               <a:rPr lang="nl-NL" smtClean="0"/>
               <a:pPr/>
-              <a:t>‹nr.›</a:t>
+              <a:t>‹#›</a:t>
             </a:fld>
             <a:endParaRPr lang="nl-NL"/>
           </a:p>
@@ -1743,7 +1746,7 @@
     </p:spTree>
     <p:extLst>
       <p:ext uri="{BB962C8B-B14F-4D97-AF65-F5344CB8AC3E}">
-        <p14:creationId xmlns:p14="http://schemas.microsoft.com/office/powerpoint/2010/main" xmlns="" val="3295216120"/>
+        <p14:creationId xmlns:p14="http://schemas.microsoft.com/office/powerpoint/2010/main" val="3295216120"/>
       </p:ext>
     </p:extLst>
   </p:cSld>
@@ -1791,10 +1794,9 @@
           <a:lstStyle/>
           <a:p>
             <a:r>
-              <a:rPr lang="nl-NL" smtClean="0"/>
+              <a:rPr lang="nl-NL"/>
               <a:t>Klik om de stijl te bewerken</a:t>
             </a:r>
-            <a:endParaRPr lang="nl-NL"/>
           </a:p>
         </p:txBody>
       </p:sp>
@@ -1857,7 +1859,7 @@
           <a:p>
             <a:pPr lvl="0"/>
             <a:r>
-              <a:rPr lang="nl-NL" smtClean="0"/>
+              <a:rPr lang="nl-NL"/>
               <a:t>Klik om de modelstijlen te bewerken</a:t>
             </a:r>
           </a:p>
@@ -1885,38 +1887,37 @@
           <a:p>
             <a:pPr lvl="0"/>
             <a:r>
-              <a:rPr lang="nl-NL" smtClean="0"/>
+              <a:rPr lang="nl-NL"/>
               <a:t>Klik om de modelstijlen te bewerken</a:t>
             </a:r>
           </a:p>
           <a:p>
             <a:pPr lvl="1"/>
             <a:r>
-              <a:rPr lang="nl-NL" smtClean="0"/>
+              <a:rPr lang="nl-NL"/>
               <a:t>Tweede niveau</a:t>
             </a:r>
           </a:p>
           <a:p>
             <a:pPr lvl="2"/>
             <a:r>
-              <a:rPr lang="nl-NL" smtClean="0"/>
+              <a:rPr lang="nl-NL"/>
               <a:t>Derde niveau</a:t>
             </a:r>
           </a:p>
           <a:p>
             <a:pPr lvl="3"/>
             <a:r>
-              <a:rPr lang="nl-NL" smtClean="0"/>
+              <a:rPr lang="nl-NL"/>
               <a:t>Vierde niveau</a:t>
             </a:r>
           </a:p>
           <a:p>
             <a:pPr lvl="4"/>
             <a:r>
-              <a:rPr lang="nl-NL" smtClean="0"/>
+              <a:rPr lang="nl-NL"/>
               <a:t>Vijfde niveau</a:t>
             </a:r>
-            <a:endParaRPr lang="nl-NL"/>
           </a:p>
         </p:txBody>
       </p:sp>
@@ -1979,7 +1980,7 @@
           <a:p>
             <a:pPr lvl="0"/>
             <a:r>
-              <a:rPr lang="nl-NL" smtClean="0"/>
+              <a:rPr lang="nl-NL"/>
               <a:t>Klik om de modelstijlen te bewerken</a:t>
             </a:r>
           </a:p>
@@ -2007,38 +2008,37 @@
           <a:p>
             <a:pPr lvl="0"/>
             <a:r>
-              <a:rPr lang="nl-NL" smtClean="0"/>
+              <a:rPr lang="nl-NL"/>
               <a:t>Klik om de modelstijlen te bewerken</a:t>
             </a:r>
           </a:p>
           <a:p>
             <a:pPr lvl="1"/>
             <a:r>
-              <a:rPr lang="nl-NL" smtClean="0"/>
+              <a:rPr lang="nl-NL"/>
               <a:t>Tweede niveau</a:t>
             </a:r>
           </a:p>
           <a:p>
             <a:pPr lvl="2"/>
             <a:r>
-              <a:rPr lang="nl-NL" smtClean="0"/>
+              <a:rPr lang="nl-NL"/>
               <a:t>Derde niveau</a:t>
             </a:r>
           </a:p>
           <a:p>
             <a:pPr lvl="3"/>
             <a:r>
-              <a:rPr lang="nl-NL" smtClean="0"/>
+              <a:rPr lang="nl-NL"/>
               <a:t>Vierde niveau</a:t>
             </a:r>
           </a:p>
           <a:p>
             <a:pPr lvl="4"/>
             <a:r>
-              <a:rPr lang="nl-NL" smtClean="0"/>
+              <a:rPr lang="nl-NL"/>
               <a:t>Vijfde niveau</a:t>
             </a:r>
-            <a:endParaRPr lang="nl-NL"/>
           </a:p>
         </p:txBody>
       </p:sp>
@@ -2060,7 +2060,7 @@
             <a:fld id="{A9D322C4-046F-4F91-8070-474DE20EE4DC}" type="datetimeFigureOut">
               <a:rPr lang="nl-NL" smtClean="0"/>
               <a:pPr/>
-              <a:t>12-9-2017</a:t>
+              <a:t>19-12-2018</a:t>
             </a:fld>
             <a:endParaRPr lang="nl-NL"/>
           </a:p>
@@ -2103,7 +2103,7 @@
             <a:fld id="{9748A9C7-2C1B-43BA-9461-C5375C79E14F}" type="slidenum">
               <a:rPr lang="nl-NL" smtClean="0"/>
               <a:pPr/>
-              <a:t>‹nr.›</a:t>
+              <a:t>‹#›</a:t>
             </a:fld>
             <a:endParaRPr lang="nl-NL"/>
           </a:p>
@@ -2112,7 +2112,7 @@
     </p:spTree>
     <p:extLst>
       <p:ext uri="{BB962C8B-B14F-4D97-AF65-F5344CB8AC3E}">
-        <p14:creationId xmlns:p14="http://schemas.microsoft.com/office/powerpoint/2010/main" xmlns="" val="441476315"/>
+        <p14:creationId xmlns:p14="http://schemas.microsoft.com/office/powerpoint/2010/main" val="441476315"/>
       </p:ext>
     </p:extLst>
   </p:cSld>
@@ -2155,10 +2155,9 @@
           <a:lstStyle/>
           <a:p>
             <a:r>
-              <a:rPr lang="nl-NL" smtClean="0"/>
+              <a:rPr lang="nl-NL"/>
               <a:t>Klik om de stijl te bewerken</a:t>
             </a:r>
-            <a:endParaRPr lang="nl-NL"/>
           </a:p>
         </p:txBody>
       </p:sp>
@@ -2180,7 +2179,7 @@
             <a:fld id="{A9D322C4-046F-4F91-8070-474DE20EE4DC}" type="datetimeFigureOut">
               <a:rPr lang="nl-NL" smtClean="0"/>
               <a:pPr/>
-              <a:t>12-9-2017</a:t>
+              <a:t>19-12-2018</a:t>
             </a:fld>
             <a:endParaRPr lang="nl-NL"/>
           </a:p>
@@ -2223,7 +2222,7 @@
             <a:fld id="{9748A9C7-2C1B-43BA-9461-C5375C79E14F}" type="slidenum">
               <a:rPr lang="nl-NL" smtClean="0"/>
               <a:pPr/>
-              <a:t>‹nr.›</a:t>
+              <a:t>‹#›</a:t>
             </a:fld>
             <a:endParaRPr lang="nl-NL"/>
           </a:p>
@@ -2232,7 +2231,7 @@
     </p:spTree>
     <p:extLst>
       <p:ext uri="{BB962C8B-B14F-4D97-AF65-F5344CB8AC3E}">
-        <p14:creationId xmlns:p14="http://schemas.microsoft.com/office/powerpoint/2010/main" xmlns="" val="426741493"/>
+        <p14:creationId xmlns:p14="http://schemas.microsoft.com/office/powerpoint/2010/main" val="426741493"/>
       </p:ext>
     </p:extLst>
   </p:cSld>
@@ -2277,7 +2276,7 @@
             <a:fld id="{A9D322C4-046F-4F91-8070-474DE20EE4DC}" type="datetimeFigureOut">
               <a:rPr lang="nl-NL" smtClean="0"/>
               <a:pPr/>
-              <a:t>12-9-2017</a:t>
+              <a:t>19-12-2018</a:t>
             </a:fld>
             <a:endParaRPr lang="nl-NL"/>
           </a:p>
@@ -2320,7 +2319,7 @@
             <a:fld id="{9748A9C7-2C1B-43BA-9461-C5375C79E14F}" type="slidenum">
               <a:rPr lang="nl-NL" smtClean="0"/>
               <a:pPr/>
-              <a:t>‹nr.›</a:t>
+              <a:t>‹#›</a:t>
             </a:fld>
             <a:endParaRPr lang="nl-NL"/>
           </a:p>
@@ -2329,7 +2328,7 @@
     </p:spTree>
     <p:extLst>
       <p:ext uri="{BB962C8B-B14F-4D97-AF65-F5344CB8AC3E}">
-        <p14:creationId xmlns:p14="http://schemas.microsoft.com/office/powerpoint/2010/main" xmlns="" val="3217459066"/>
+        <p14:creationId xmlns:p14="http://schemas.microsoft.com/office/powerpoint/2010/main" val="3217459066"/>
       </p:ext>
     </p:extLst>
   </p:cSld>
@@ -2381,10 +2380,9 @@
           </a:lstStyle>
           <a:p>
             <a:r>
-              <a:rPr lang="nl-NL" smtClean="0"/>
+              <a:rPr lang="nl-NL"/>
               <a:t>Klik om de stijl te bewerken</a:t>
             </a:r>
-            <a:endParaRPr lang="nl-NL"/>
           </a:p>
         </p:txBody>
       </p:sp>
@@ -2438,38 +2436,37 @@
           <a:p>
             <a:pPr lvl="0"/>
             <a:r>
-              <a:rPr lang="nl-NL" smtClean="0"/>
+              <a:rPr lang="nl-NL"/>
               <a:t>Klik om de modelstijlen te bewerken</a:t>
             </a:r>
           </a:p>
           <a:p>
             <a:pPr lvl="1"/>
             <a:r>
-              <a:rPr lang="nl-NL" smtClean="0"/>
+              <a:rPr lang="nl-NL"/>
               <a:t>Tweede niveau</a:t>
             </a:r>
           </a:p>
           <a:p>
             <a:pPr lvl="2"/>
             <a:r>
-              <a:rPr lang="nl-NL" smtClean="0"/>
+              <a:rPr lang="nl-NL"/>
               <a:t>Derde niveau</a:t>
             </a:r>
           </a:p>
           <a:p>
             <a:pPr lvl="3"/>
             <a:r>
-              <a:rPr lang="nl-NL" smtClean="0"/>
+              <a:rPr lang="nl-NL"/>
               <a:t>Vierde niveau</a:t>
             </a:r>
           </a:p>
           <a:p>
             <a:pPr lvl="4"/>
             <a:r>
-              <a:rPr lang="nl-NL" smtClean="0"/>
+              <a:rPr lang="nl-NL"/>
               <a:t>Vijfde niveau</a:t>
             </a:r>
-            <a:endParaRPr lang="nl-NL"/>
           </a:p>
         </p:txBody>
       </p:sp>
@@ -2532,7 +2529,7 @@
           <a:p>
             <a:pPr lvl="0"/>
             <a:r>
-              <a:rPr lang="nl-NL" smtClean="0"/>
+              <a:rPr lang="nl-NL"/>
               <a:t>Klik om de modelstijlen te bewerken</a:t>
             </a:r>
           </a:p>
@@ -2556,7 +2553,7 @@
             <a:fld id="{A9D322C4-046F-4F91-8070-474DE20EE4DC}" type="datetimeFigureOut">
               <a:rPr lang="nl-NL" smtClean="0"/>
               <a:pPr/>
-              <a:t>12-9-2017</a:t>
+              <a:t>19-12-2018</a:t>
             </a:fld>
             <a:endParaRPr lang="nl-NL"/>
           </a:p>
@@ -2599,7 +2596,7 @@
             <a:fld id="{9748A9C7-2C1B-43BA-9461-C5375C79E14F}" type="slidenum">
               <a:rPr lang="nl-NL" smtClean="0"/>
               <a:pPr/>
-              <a:t>‹nr.›</a:t>
+              <a:t>‹#›</a:t>
             </a:fld>
             <a:endParaRPr lang="nl-NL"/>
           </a:p>
@@ -2608,7 +2605,7 @@
     </p:spTree>
     <p:extLst>
       <p:ext uri="{BB962C8B-B14F-4D97-AF65-F5344CB8AC3E}">
-        <p14:creationId xmlns:p14="http://schemas.microsoft.com/office/powerpoint/2010/main" xmlns="" val="1549087554"/>
+        <p14:creationId xmlns:p14="http://schemas.microsoft.com/office/powerpoint/2010/main" val="1549087554"/>
       </p:ext>
     </p:extLst>
   </p:cSld>
@@ -2660,10 +2657,9 @@
           </a:lstStyle>
           <a:p>
             <a:r>
-              <a:rPr lang="nl-NL" smtClean="0"/>
+              <a:rPr lang="nl-NL"/>
               <a:t>Klik om de stijl te bewerken</a:t>
             </a:r>
-            <a:endParaRPr lang="nl-NL"/>
           </a:p>
         </p:txBody>
       </p:sp>
@@ -2787,7 +2783,7 @@
           <a:p>
             <a:pPr lvl="0"/>
             <a:r>
-              <a:rPr lang="nl-NL" smtClean="0"/>
+              <a:rPr lang="nl-NL"/>
               <a:t>Klik om de modelstijlen te bewerken</a:t>
             </a:r>
           </a:p>
@@ -2811,7 +2807,7 @@
             <a:fld id="{A9D322C4-046F-4F91-8070-474DE20EE4DC}" type="datetimeFigureOut">
               <a:rPr lang="nl-NL" smtClean="0"/>
               <a:pPr/>
-              <a:t>12-9-2017</a:t>
+              <a:t>19-12-2018</a:t>
             </a:fld>
             <a:endParaRPr lang="nl-NL"/>
           </a:p>
@@ -2854,7 +2850,7 @@
             <a:fld id="{9748A9C7-2C1B-43BA-9461-C5375C79E14F}" type="slidenum">
               <a:rPr lang="nl-NL" smtClean="0"/>
               <a:pPr/>
-              <a:t>‹nr.›</a:t>
+              <a:t>‹#›</a:t>
             </a:fld>
             <a:endParaRPr lang="nl-NL"/>
           </a:p>
@@ -2863,7 +2859,7 @@
     </p:spTree>
     <p:extLst>
       <p:ext uri="{BB962C8B-B14F-4D97-AF65-F5344CB8AC3E}">
-        <p14:creationId xmlns:p14="http://schemas.microsoft.com/office/powerpoint/2010/main" xmlns="" val="2999059211"/>
+        <p14:creationId xmlns:p14="http://schemas.microsoft.com/office/powerpoint/2010/main" val="2999059211"/>
       </p:ext>
     </p:extLst>
   </p:cSld>
@@ -2921,10 +2917,9 @@
           <a:lstStyle/>
           <a:p>
             <a:r>
-              <a:rPr lang="nl-NL" smtClean="0"/>
+              <a:rPr lang="nl-NL"/>
               <a:t>Klik om de stijl te bewerken</a:t>
             </a:r>
-            <a:endParaRPr lang="nl-NL"/>
           </a:p>
         </p:txBody>
       </p:sp>
@@ -2955,38 +2950,37 @@
           <a:p>
             <a:pPr lvl="0"/>
             <a:r>
-              <a:rPr lang="nl-NL" smtClean="0"/>
+              <a:rPr lang="nl-NL"/>
               <a:t>Klik om de modelstijlen te bewerken</a:t>
             </a:r>
           </a:p>
           <a:p>
             <a:pPr lvl="1"/>
             <a:r>
-              <a:rPr lang="nl-NL" smtClean="0"/>
+              <a:rPr lang="nl-NL"/>
               <a:t>Tweede niveau</a:t>
             </a:r>
           </a:p>
           <a:p>
             <a:pPr lvl="2"/>
             <a:r>
-              <a:rPr lang="nl-NL" smtClean="0"/>
+              <a:rPr lang="nl-NL"/>
               <a:t>Derde niveau</a:t>
             </a:r>
           </a:p>
           <a:p>
             <a:pPr lvl="3"/>
             <a:r>
-              <a:rPr lang="nl-NL" smtClean="0"/>
+              <a:rPr lang="nl-NL"/>
               <a:t>Vierde niveau</a:t>
             </a:r>
           </a:p>
           <a:p>
             <a:pPr lvl="4"/>
             <a:r>
-              <a:rPr lang="nl-NL" smtClean="0"/>
+              <a:rPr lang="nl-NL"/>
               <a:t>Vijfde niveau</a:t>
             </a:r>
-            <a:endParaRPr lang="nl-NL"/>
           </a:p>
         </p:txBody>
       </p:sp>
@@ -3026,7 +3020,7 @@
             <a:fld id="{A9D322C4-046F-4F91-8070-474DE20EE4DC}" type="datetimeFigureOut">
               <a:rPr lang="nl-NL" smtClean="0"/>
               <a:pPr/>
-              <a:t>12-9-2017</a:t>
+              <a:t>19-12-2018</a:t>
             </a:fld>
             <a:endParaRPr lang="nl-NL"/>
           </a:p>
@@ -3105,7 +3099,7 @@
             <a:fld id="{9748A9C7-2C1B-43BA-9461-C5375C79E14F}" type="slidenum">
               <a:rPr lang="nl-NL" smtClean="0"/>
               <a:pPr/>
-              <a:t>‹nr.›</a:t>
+              <a:t>‹#›</a:t>
             </a:fld>
             <a:endParaRPr lang="nl-NL"/>
           </a:p>
@@ -3114,7 +3108,7 @@
     </p:spTree>
     <p:extLst>
       <p:ext uri="{BB962C8B-B14F-4D97-AF65-F5344CB8AC3E}">
-        <p14:creationId xmlns:p14="http://schemas.microsoft.com/office/powerpoint/2010/main" xmlns="" val="1130228611"/>
+        <p14:creationId xmlns:p14="http://schemas.microsoft.com/office/powerpoint/2010/main" val="1130228611"/>
       </p:ext>
     </p:extLst>
   </p:cSld>
@@ -3448,12 +3442,8 @@
           <a:lstStyle/>
           <a:p>
             <a:r>
-              <a:rPr lang="en-US" dirty="0" smtClean="0"/>
+              <a:rPr lang="en-US" dirty="0"/>
               <a:t>BETL</a:t>
-            </a:r>
-            <a:r>
-              <a:rPr lang="en-US" dirty="0"/>
-              <a:t/>
             </a:r>
             <a:br>
               <a:rPr lang="en-US" dirty="0"/>
@@ -3481,7 +3471,7 @@
               <a:buNone/>
             </a:pPr>
             <a:r>
-              <a:rPr lang="en-US" dirty="0" smtClean="0"/>
+              <a:rPr lang="en-US" dirty="0"/>
               <a:t> </a:t>
             </a:r>
             <a:endParaRPr lang="nl-NL" dirty="0"/>
@@ -3525,7 +3515,7 @@
           <a:p>
             <a:pPr algn="ctr"/>
             <a:r>
-              <a:rPr lang="en-US" dirty="0" smtClean="0"/>
+              <a:rPr lang="en-US" dirty="0"/>
               <a:t>BETL</a:t>
             </a:r>
             <a:endParaRPr lang="nl-NL" dirty="0"/>
@@ -3569,7 +3559,7 @@
           <a:p>
             <a:pPr algn="ctr"/>
             <a:r>
-              <a:rPr lang="en-US" dirty="0" err="1" smtClean="0"/>
+              <a:rPr lang="en-US" dirty="0" err="1"/>
               <a:t>Object_meta_data</a:t>
             </a:r>
             <a:endParaRPr lang="nl-NL" dirty="0"/>
@@ -3613,7 +3603,7 @@
           <a:p>
             <a:pPr algn="ctr"/>
             <a:r>
-              <a:rPr lang="en-US" dirty="0" smtClean="0"/>
+              <a:rPr lang="en-US" dirty="0"/>
               <a:t>Logging</a:t>
             </a:r>
             <a:endParaRPr lang="nl-NL" dirty="0"/>
@@ -3707,7 +3697,7 @@
           <a:noFill/>
           <a:extLst>
             <a:ext uri="{909E8E84-426E-40DD-AFC4-6F175D3DCCD1}">
-              <a14:hiddenFill xmlns:a14="http://schemas.microsoft.com/office/drawing/2010/main" xmlns="">
+              <a14:hiddenFill xmlns:a14="http://schemas.microsoft.com/office/drawing/2010/main">
                 <a:solidFill>
                   <a:srgbClr val="FFFFFF"/>
                 </a:solidFill>
@@ -3739,7 +3729,7 @@
           <a:blip r:embed="rId3" cstate="print">
             <a:extLst>
               <a:ext uri="{28A0092B-C50C-407E-A947-70E740481C1C}">
-                <a14:useLocalDpi xmlns:a14="http://schemas.microsoft.com/office/drawing/2010/main" xmlns="" val="0"/>
+                <a14:useLocalDpi xmlns:a14="http://schemas.microsoft.com/office/drawing/2010/main" val="0"/>
               </a:ext>
             </a:extLst>
           </a:blip>
@@ -3759,7 +3749,7 @@
           <a:noFill/>
           <a:extLst>
             <a:ext uri="{909E8E84-426E-40DD-AFC4-6F175D3DCCD1}">
-              <a14:hiddenFill xmlns:a14="http://schemas.microsoft.com/office/drawing/2010/main" xmlns="">
+              <a14:hiddenFill xmlns:a14="http://schemas.microsoft.com/office/drawing/2010/main">
                 <a:solidFill>
                   <a:srgbClr val="FFFFFF"/>
                 </a:solidFill>
@@ -3791,7 +3781,7 @@
           <a:lstStyle/>
           <a:p>
             <a:r>
-              <a:rPr lang="en-US" dirty="0" smtClean="0"/>
+              <a:rPr lang="en-US" dirty="0"/>
               <a:t>BETL Engine</a:t>
             </a:r>
             <a:endParaRPr lang="nl-NL" dirty="0"/>
@@ -3871,7 +3861,7 @@
           <a:p>
             <a:pPr algn="ctr"/>
             <a:r>
-              <a:rPr lang="en-US" dirty="0" err="1" smtClean="0"/>
+              <a:rPr lang="en-US" dirty="0" err="1"/>
               <a:t>AdventureWorks</a:t>
             </a:r>
             <a:endParaRPr lang="nl-NL" dirty="0"/>
@@ -3973,7 +3963,7 @@
           <a:lstStyle/>
           <a:p>
             <a:r>
-              <a:rPr lang="en-US" dirty="0" smtClean="0"/>
+              <a:rPr lang="en-US" dirty="0"/>
               <a:t>SRC</a:t>
             </a:r>
             <a:endParaRPr lang="nl-NL" dirty="0"/>
@@ -4003,7 +3993,7 @@
           <a:lstStyle/>
           <a:p>
             <a:r>
-              <a:rPr lang="en-US" dirty="0" smtClean="0"/>
+              <a:rPr lang="en-US" dirty="0"/>
               <a:t>TRG</a:t>
             </a:r>
             <a:endParaRPr lang="nl-NL" dirty="0"/>
@@ -4065,7 +4055,7 @@
           <a:noFill/>
           <a:extLst>
             <a:ext uri="{909E8E84-426E-40DD-AFC4-6F175D3DCCD1}">
-              <a14:hiddenFill xmlns:a14="http://schemas.microsoft.com/office/drawing/2010/main" xmlns="">
+              <a14:hiddenFill xmlns:a14="http://schemas.microsoft.com/office/drawing/2010/main">
                 <a:solidFill>
                   <a:srgbClr val="FFFFFF"/>
                 </a:solidFill>
@@ -4132,7 +4122,7 @@
           <a:lstStyle/>
           <a:p>
             <a:r>
-              <a:rPr lang="en-US" dirty="0" smtClean="0"/>
+              <a:rPr lang="en-US" dirty="0"/>
               <a:t>BI DEVELOPER</a:t>
             </a:r>
             <a:endParaRPr lang="nl-NL" dirty="0"/>
@@ -4162,7 +4152,7 @@
           <a:lstStyle/>
           <a:p>
             <a:r>
-              <a:rPr lang="en-US" dirty="0" smtClean="0"/>
+              <a:rPr lang="en-US" dirty="0"/>
               <a:t>PUSH SRC</a:t>
             </a:r>
             <a:endParaRPr lang="nl-NL" dirty="0"/>
@@ -4188,7 +4178,7 @@
           <a:noFill/>
           <a:extLst>
             <a:ext uri="{909E8E84-426E-40DD-AFC4-6F175D3DCCD1}">
-              <a14:hiddenFill xmlns:a14="http://schemas.microsoft.com/office/drawing/2010/main" xmlns="">
+              <a14:hiddenFill xmlns:a14="http://schemas.microsoft.com/office/drawing/2010/main">
                 <a:solidFill>
                   <a:srgbClr val="FFFFFF"/>
                 </a:solidFill>
@@ -4220,7 +4210,7 @@
           <a:blip r:embed="rId5" cstate="print">
             <a:extLst>
               <a:ext uri="{28A0092B-C50C-407E-A947-70E740481C1C}">
-                <a14:useLocalDpi xmlns:a14="http://schemas.microsoft.com/office/drawing/2010/main" xmlns="" val="0"/>
+                <a14:useLocalDpi xmlns:a14="http://schemas.microsoft.com/office/drawing/2010/main" val="0"/>
               </a:ext>
             </a:extLst>
           </a:blip>
@@ -4240,7 +4230,7 @@
           <a:noFill/>
           <a:extLst>
             <a:ext uri="{909E8E84-426E-40DD-AFC4-6F175D3DCCD1}">
-              <a14:hiddenFill xmlns:a14="http://schemas.microsoft.com/office/drawing/2010/main" xmlns="">
+              <a14:hiddenFill xmlns:a14="http://schemas.microsoft.com/office/drawing/2010/main">
                 <a:solidFill>
                   <a:srgbClr val="FFFFFF"/>
                 </a:solidFill>
@@ -4286,7 +4276,7 @@
           <a:p>
             <a:pPr algn="ctr"/>
             <a:r>
-              <a:rPr lang="en-US" dirty="0" err="1" smtClean="0"/>
+              <a:rPr lang="en-US" dirty="0" err="1"/>
               <a:t>Config</a:t>
             </a:r>
             <a:endParaRPr lang="nl-NL" dirty="0"/>
@@ -4399,20 +4389,13 @@
     </p:spTree>
     <p:extLst>
       <p:ext uri="{BB962C8B-B14F-4D97-AF65-F5344CB8AC3E}">
-        <p14:creationId xmlns:p14="http://schemas.microsoft.com/office/powerpoint/2010/main" xmlns="" val="2904681902"/>
+        <p14:creationId xmlns:p14="http://schemas.microsoft.com/office/powerpoint/2010/main" val="2904681902"/>
       </p:ext>
     </p:extLst>
   </p:cSld>
   <p:clrMapOvr>
     <a:masterClrMapping/>
   </p:clrMapOvr>
-  <p:timing>
-    <p:tnLst>
-      <p:par>
-        <p:cTn id="1" dur="indefinite" restart="never" nodeType="tmRoot"/>
-      </p:par>
-    </p:tnLst>
-  </p:timing>
 </p:sld>
 </file>
 
@@ -4470,7 +4453,7 @@
           <a:p>
             <a:pPr algn="ctr"/>
             <a:r>
-              <a:rPr lang="en-US" dirty="0" smtClean="0"/>
+              <a:rPr lang="en-US" dirty="0"/>
               <a:t>Source system A</a:t>
             </a:r>
             <a:endParaRPr lang="nl-NL" dirty="0"/>
@@ -4514,7 +4497,7 @@
           <a:p>
             <a:pPr algn="ctr"/>
             <a:r>
-              <a:rPr lang="en-US" dirty="0" smtClean="0"/>
+              <a:rPr lang="en-US" dirty="0"/>
               <a:t>Source system B</a:t>
             </a:r>
             <a:endParaRPr lang="nl-NL" dirty="0"/>
@@ -4558,7 +4541,7 @@
           <a:p>
             <a:pPr algn="ctr"/>
             <a:r>
-              <a:rPr lang="en-US" dirty="0" smtClean="0"/>
+              <a:rPr lang="en-US" dirty="0"/>
               <a:t>Source system C</a:t>
             </a:r>
             <a:endParaRPr lang="nl-NL" dirty="0"/>
@@ -4602,7 +4585,7 @@
           <a:p>
             <a:pPr algn="ctr"/>
             <a:r>
-              <a:rPr lang="en-US" dirty="0" smtClean="0"/>
+              <a:rPr lang="en-US" dirty="0"/>
               <a:t>Staging</a:t>
             </a:r>
             <a:endParaRPr lang="nl-NL" dirty="0"/>
@@ -4748,14 +4731,13 @@
           <a:lstStyle/>
           <a:p>
             <a:r>
-              <a:rPr lang="nl-NL" dirty="0" err="1" smtClean="0"/>
+              <a:rPr lang="nl-NL" dirty="0" err="1"/>
               <a:t>Staging</a:t>
             </a:r>
             <a:r>
-              <a:rPr lang="nl-NL" dirty="0" smtClean="0"/>
+              <a:rPr lang="nl-NL" dirty="0"/>
               <a:t> ETL</a:t>
             </a:r>
-            <a:endParaRPr lang="nl-NL" dirty="0"/>
           </a:p>
         </p:txBody>
       </p:sp>
@@ -4796,7 +4778,7 @@
           <a:p>
             <a:pPr algn="ctr"/>
             <a:r>
-              <a:rPr lang="en-US" dirty="0" smtClean="0"/>
+              <a:rPr lang="en-US" dirty="0"/>
               <a:t>DWH</a:t>
             </a:r>
             <a:endParaRPr lang="nl-NL" dirty="0"/>
@@ -4914,7 +4896,7 @@
           <a:p>
             <a:pPr algn="ctr"/>
             <a:r>
-              <a:rPr lang="en-US" dirty="0" err="1" smtClean="0"/>
+              <a:rPr lang="en-US" dirty="0" err="1"/>
               <a:t>Datamart</a:t>
             </a:r>
             <a:endParaRPr lang="nl-NL" dirty="0"/>
@@ -4944,14 +4926,13 @@
           <a:lstStyle/>
           <a:p>
             <a:r>
-              <a:rPr lang="nl-NL" dirty="0" err="1" smtClean="0"/>
+              <a:rPr lang="nl-NL" dirty="0" err="1"/>
               <a:t>Transform</a:t>
             </a:r>
             <a:r>
-              <a:rPr lang="nl-NL" dirty="0" smtClean="0"/>
+              <a:rPr lang="nl-NL" dirty="0"/>
               <a:t> ETL</a:t>
             </a:r>
-            <a:endParaRPr lang="nl-NL" dirty="0"/>
           </a:p>
         </p:txBody>
       </p:sp>
@@ -4978,14 +4959,13 @@
           <a:lstStyle/>
           <a:p>
             <a:r>
-              <a:rPr lang="nl-NL" dirty="0" err="1" smtClean="0"/>
+              <a:rPr lang="nl-NL" dirty="0" err="1"/>
               <a:t>Datamart</a:t>
             </a:r>
             <a:r>
-              <a:rPr lang="nl-NL" dirty="0" smtClean="0"/>
+              <a:rPr lang="nl-NL" dirty="0"/>
               <a:t> ETL</a:t>
             </a:r>
-            <a:endParaRPr lang="nl-NL" dirty="0"/>
           </a:p>
         </p:txBody>
       </p:sp>
@@ -5054,10 +5034,9 @@
           <a:p>
             <a:pPr algn="ctr"/>
             <a:r>
-              <a:rPr lang="nl-NL" dirty="0" smtClean="0"/>
+              <a:rPr lang="nl-NL" dirty="0"/>
               <a:t>schema</a:t>
             </a:r>
-            <a:endParaRPr lang="nl-NL" dirty="0"/>
           </a:p>
         </p:txBody>
       </p:sp>
@@ -5101,10 +5080,9 @@
           <a:p>
             <a:pPr algn="ctr"/>
             <a:r>
-              <a:rPr lang="nl-NL" dirty="0" smtClean="0"/>
+              <a:rPr lang="nl-NL" dirty="0"/>
               <a:t>schema</a:t>
             </a:r>
-            <a:endParaRPr lang="nl-NL" dirty="0"/>
           </a:p>
         </p:txBody>
       </p:sp>
@@ -5143,10 +5121,9 @@
           <a:p>
             <a:pPr algn="ctr"/>
             <a:r>
-              <a:rPr lang="nl-NL" dirty="0" smtClean="0"/>
+              <a:rPr lang="nl-NL" dirty="0"/>
               <a:t>A</a:t>
             </a:r>
-            <a:endParaRPr lang="nl-NL" dirty="0"/>
           </a:p>
         </p:txBody>
       </p:sp>
@@ -5187,10 +5164,9 @@
           <a:p>
             <a:pPr algn="ctr"/>
             <a:r>
-              <a:rPr lang="nl-NL" dirty="0" smtClean="0"/>
+              <a:rPr lang="nl-NL" dirty="0"/>
               <a:t>database</a:t>
             </a:r>
-            <a:endParaRPr lang="nl-NL" dirty="0"/>
           </a:p>
         </p:txBody>
       </p:sp>
@@ -5231,10 +5207,9 @@
           <a:p>
             <a:pPr algn="ctr"/>
             <a:r>
-              <a:rPr lang="nl-NL" dirty="0" smtClean="0"/>
+              <a:rPr lang="nl-NL" dirty="0"/>
               <a:t>server</a:t>
             </a:r>
-            <a:endParaRPr lang="nl-NL" dirty="0"/>
           </a:p>
         </p:txBody>
       </p:sp>
@@ -5261,22 +5236,21 @@
           <a:lstStyle/>
           <a:p>
             <a:r>
-              <a:rPr lang="nl-NL" dirty="0" err="1" smtClean="0"/>
+              <a:rPr lang="nl-NL" dirty="0" err="1"/>
               <a:t>table</a:t>
             </a:r>
             <a:r>
-              <a:rPr lang="nl-NL" dirty="0" smtClean="0"/>
+              <a:rPr lang="nl-NL" dirty="0"/>
               <a:t> </a:t>
             </a:r>
             <a:r>
-              <a:rPr lang="nl-NL" dirty="0" err="1" smtClean="0"/>
+              <a:rPr lang="nl-NL" dirty="0" err="1"/>
               <a:t>or</a:t>
             </a:r>
             <a:r>
-              <a:rPr lang="nl-NL" dirty="0" smtClean="0"/>
+              <a:rPr lang="nl-NL" dirty="0"/>
               <a:t> view</a:t>
             </a:r>
-            <a:endParaRPr lang="nl-NL" dirty="0"/>
           </a:p>
         </p:txBody>
       </p:sp>
@@ -5315,10 +5289,9 @@
           <a:p>
             <a:pPr algn="ctr"/>
             <a:r>
-              <a:rPr lang="nl-NL" dirty="0" smtClean="0"/>
+              <a:rPr lang="nl-NL" dirty="0"/>
               <a:t>B</a:t>
             </a:r>
-            <a:endParaRPr lang="nl-NL" dirty="0"/>
           </a:p>
         </p:txBody>
       </p:sp>
@@ -5345,7 +5318,7 @@
           <a:lstStyle/>
           <a:p>
             <a:r>
-              <a:rPr lang="nl-NL" dirty="0" err="1" smtClean="0"/>
+              <a:rPr lang="nl-NL" dirty="0" err="1"/>
               <a:t>table</a:t>
             </a:r>
             <a:endParaRPr lang="nl-NL" dirty="0"/>
@@ -5389,10 +5362,9 @@
           <a:p>
             <a:pPr algn="ctr"/>
             <a:r>
-              <a:rPr lang="nl-NL" dirty="0" smtClean="0"/>
+              <a:rPr lang="nl-NL" dirty="0"/>
               <a:t>database</a:t>
             </a:r>
-            <a:endParaRPr lang="nl-NL" dirty="0"/>
           </a:p>
         </p:txBody>
       </p:sp>
@@ -5433,10 +5405,9 @@
           <a:p>
             <a:pPr algn="ctr"/>
             <a:r>
-              <a:rPr lang="nl-NL" dirty="0" smtClean="0"/>
+              <a:rPr lang="nl-NL" dirty="0"/>
               <a:t>server</a:t>
             </a:r>
-            <a:endParaRPr lang="nl-NL" dirty="0"/>
           </a:p>
         </p:txBody>
       </p:sp>
@@ -5488,7 +5459,7 @@
           <a:blip r:embed="rId2" cstate="print">
             <a:extLst>
               <a:ext uri="{28A0092B-C50C-407E-A947-70E740481C1C}">
-                <a14:useLocalDpi xmlns:a14="http://schemas.microsoft.com/office/drawing/2010/main" xmlns="" val="0"/>
+                <a14:useLocalDpi xmlns:a14="http://schemas.microsoft.com/office/drawing/2010/main" val="0"/>
               </a:ext>
             </a:extLst>
           </a:blip>
@@ -5508,7 +5479,7 @@
           <a:noFill/>
           <a:extLst>
             <a:ext uri="{909E8E84-426E-40DD-AFC4-6F175D3DCCD1}">
-              <a14:hiddenFill xmlns:a14="http://schemas.microsoft.com/office/drawing/2010/main" xmlns="">
+              <a14:hiddenFill xmlns:a14="http://schemas.microsoft.com/office/drawing/2010/main">
                 <a:solidFill>
                   <a:srgbClr val="FFFFFF"/>
                 </a:solidFill>
@@ -5540,7 +5511,7 @@
           <a:lstStyle/>
           <a:p>
             <a:r>
-              <a:rPr lang="en-US" dirty="0" smtClean="0"/>
+              <a:rPr lang="en-US" dirty="0"/>
               <a:t>BETL Engine</a:t>
             </a:r>
             <a:endParaRPr lang="nl-NL" dirty="0"/>
@@ -5654,7 +5625,7 @@
           <a:p>
             <a:pPr algn="ctr"/>
             <a:r>
-              <a:rPr lang="en-US" dirty="0" smtClean="0"/>
+              <a:rPr lang="en-US" dirty="0"/>
               <a:t>BETL</a:t>
             </a:r>
             <a:endParaRPr lang="nl-NL" dirty="0"/>
@@ -5701,15 +5672,15 @@
           <a:p>
             <a:pPr algn="ctr"/>
             <a:r>
-              <a:rPr lang="en-US" dirty="0" smtClean="0"/>
+              <a:rPr lang="en-US" dirty="0"/>
               <a:t>Meta data </a:t>
             </a:r>
             <a:r>
-              <a:rPr lang="en-US" dirty="0" err="1" smtClean="0"/>
+              <a:rPr lang="en-US" dirty="0" err="1"/>
               <a:t>repostiory</a:t>
             </a:r>
             <a:r>
-              <a:rPr lang="en-US" dirty="0" smtClean="0"/>
+              <a:rPr lang="en-US" dirty="0"/>
               <a:t> (def)</a:t>
             </a:r>
             <a:endParaRPr lang="nl-NL" dirty="0"/>
@@ -5756,15 +5727,15 @@
           <a:p>
             <a:pPr algn="ctr"/>
             <a:r>
-              <a:rPr lang="en-US" dirty="0" smtClean="0"/>
+              <a:rPr lang="en-US" dirty="0"/>
               <a:t>ETL process data (</a:t>
             </a:r>
             <a:r>
-              <a:rPr lang="en-US" dirty="0" err="1" smtClean="0"/>
+              <a:rPr lang="en-US" dirty="0" err="1"/>
               <a:t>dbo</a:t>
             </a:r>
             <a:r>
-              <a:rPr lang="en-US" dirty="0" smtClean="0"/>
+              <a:rPr lang="en-US" dirty="0"/>
               <a:t>)</a:t>
             </a:r>
             <a:endParaRPr lang="nl-NL" dirty="0"/>
@@ -5811,15 +5782,15 @@
           <a:p>
             <a:pPr algn="ctr"/>
             <a:r>
-              <a:rPr lang="en-US" dirty="0" smtClean="0"/>
+              <a:rPr lang="en-US" dirty="0"/>
               <a:t>Utility functions (</a:t>
             </a:r>
             <a:r>
-              <a:rPr lang="en-US" dirty="0" err="1" smtClean="0"/>
+              <a:rPr lang="en-US" dirty="0" err="1"/>
               <a:t>util</a:t>
             </a:r>
             <a:r>
-              <a:rPr lang="en-US" dirty="0" smtClean="0"/>
+              <a:rPr lang="en-US" dirty="0"/>
               <a:t>)</a:t>
             </a:r>
             <a:endParaRPr lang="nl-NL" dirty="0"/>
@@ -5908,7 +5879,7 @@
           <a:lstStyle/>
           <a:p>
             <a:r>
-              <a:rPr lang="en-US" dirty="0" smtClean="0"/>
+              <a:rPr lang="en-US" dirty="0"/>
               <a:t>BI DEVELOPER</a:t>
             </a:r>
             <a:endParaRPr lang="nl-NL" dirty="0"/>
@@ -5938,22 +5909,21 @@
           <a:lstStyle/>
           <a:p>
             <a:r>
-              <a:rPr lang="nl-NL" dirty="0" err="1" smtClean="0"/>
+              <a:rPr lang="nl-NL" dirty="0" err="1"/>
               <a:t>exec</a:t>
             </a:r>
             <a:r>
-              <a:rPr lang="nl-NL" dirty="0" smtClean="0"/>
+              <a:rPr lang="nl-NL" dirty="0"/>
               <a:t> </a:t>
             </a:r>
             <a:r>
-              <a:rPr lang="nl-NL" dirty="0" err="1" smtClean="0"/>
+              <a:rPr lang="nl-NL" dirty="0" err="1"/>
               <a:t>betl.dbo.push</a:t>
             </a:r>
             <a:r>
-              <a:rPr lang="nl-NL" dirty="0" smtClean="0"/>
+              <a:rPr lang="nl-NL" dirty="0"/>
               <a:t> ‘A’</a:t>
             </a:r>
-            <a:endParaRPr lang="nl-NL" dirty="0"/>
           </a:p>
         </p:txBody>
       </p:sp>
@@ -6025,7 +5995,7 @@
           <a:p>
             <a:pPr algn="ctr"/>
             <a:r>
-              <a:rPr lang="nl-NL" dirty="0" smtClean="0">
+              <a:rPr lang="nl-NL" dirty="0">
                 <a:solidFill>
                   <a:srgbClr val="FF0000"/>
                 </a:solidFill>
@@ -6033,7 +6003,7 @@
               <a:t>Database object tree (</a:t>
             </a:r>
             <a:r>
-              <a:rPr lang="nl-NL" dirty="0" err="1" smtClean="0">
+              <a:rPr lang="nl-NL" dirty="0" err="1">
                 <a:solidFill>
                   <a:srgbClr val="FF0000"/>
                 </a:solidFill>
@@ -6041,7 +6011,7 @@
               <a:t>def.Obj</a:t>
             </a:r>
             <a:r>
-              <a:rPr lang="nl-NL" dirty="0" smtClean="0">
+              <a:rPr lang="nl-NL" dirty="0">
                 <a:solidFill>
                   <a:srgbClr val="FF0000"/>
                 </a:solidFill>
@@ -6049,7 +6019,7 @@
               <a:t>_</a:t>
             </a:r>
             <a:r>
-              <a:rPr lang="nl-NL" dirty="0" err="1" smtClean="0">
+              <a:rPr lang="nl-NL" dirty="0" err="1">
                 <a:solidFill>
                   <a:srgbClr val="FF0000"/>
                 </a:solidFill>
@@ -6057,18 +6027,13 @@
               <a:t>ext</a:t>
             </a:r>
             <a:r>
-              <a:rPr lang="nl-NL" dirty="0" smtClean="0">
+              <a:rPr lang="nl-NL" dirty="0">
                 <a:solidFill>
                   <a:srgbClr val="FF0000"/>
                 </a:solidFill>
               </a:rPr>
               <a:t>)</a:t>
             </a:r>
-            <a:endParaRPr lang="nl-NL" dirty="0">
-              <a:solidFill>
-                <a:srgbClr val="FF0000"/>
-              </a:solidFill>
-            </a:endParaRPr>
           </a:p>
         </p:txBody>
       </p:sp>
@@ -6112,7 +6077,7 @@
           <a:p>
             <a:pPr algn="ctr"/>
             <a:r>
-              <a:rPr lang="en-US" dirty="0" smtClean="0">
+              <a:rPr lang="en-US" dirty="0">
                 <a:solidFill>
                   <a:srgbClr val="FF0000"/>
                 </a:solidFill>
@@ -6120,7 +6085,7 @@
               <a:t>Meta data </a:t>
             </a:r>
             <a:r>
-              <a:rPr lang="en-US" dirty="0" err="1" smtClean="0">
+              <a:rPr lang="en-US" dirty="0" err="1">
                 <a:solidFill>
                   <a:srgbClr val="FF0000"/>
                 </a:solidFill>
@@ -6128,7 +6093,7 @@
               <a:t>repostiory</a:t>
             </a:r>
             <a:r>
-              <a:rPr lang="en-US" dirty="0" smtClean="0">
+              <a:rPr lang="en-US" dirty="0">
                 <a:solidFill>
                   <a:srgbClr val="FF0000"/>
                 </a:solidFill>
@@ -6183,10 +6148,9 @@
           <a:p>
             <a:pPr algn="ctr"/>
             <a:r>
-              <a:rPr lang="nl-NL" dirty="0" smtClean="0"/>
+              <a:rPr lang="nl-NL" dirty="0"/>
               <a:t>schema</a:t>
             </a:r>
-            <a:endParaRPr lang="nl-NL" dirty="0"/>
           </a:p>
         </p:txBody>
       </p:sp>
@@ -6225,14 +6189,13 @@
           <a:p>
             <a:pPr algn="ctr"/>
             <a:r>
-              <a:rPr lang="nl-NL" dirty="0" err="1" smtClean="0"/>
+              <a:rPr lang="nl-NL" dirty="0" err="1"/>
               <a:t>Table</a:t>
             </a:r>
             <a:r>
-              <a:rPr lang="nl-NL" dirty="0" smtClean="0"/>
+              <a:rPr lang="nl-NL" dirty="0"/>
               <a:t> A</a:t>
             </a:r>
-            <a:endParaRPr lang="nl-NL" dirty="0"/>
           </a:p>
         </p:txBody>
       </p:sp>
@@ -6273,10 +6236,9 @@
           <a:p>
             <a:pPr algn="ctr"/>
             <a:r>
-              <a:rPr lang="nl-NL" dirty="0" smtClean="0"/>
+              <a:rPr lang="nl-NL" dirty="0"/>
               <a:t>Database B</a:t>
             </a:r>
-            <a:endParaRPr lang="nl-NL" dirty="0"/>
           </a:p>
         </p:txBody>
       </p:sp>
@@ -6317,10 +6279,9 @@
           <a:p>
             <a:pPr algn="ctr"/>
             <a:r>
-              <a:rPr lang="nl-NL" dirty="0" smtClean="0"/>
+              <a:rPr lang="nl-NL" dirty="0"/>
               <a:t>Server X</a:t>
             </a:r>
-            <a:endParaRPr lang="nl-NL" dirty="0"/>
           </a:p>
         </p:txBody>
       </p:sp>
@@ -6361,10 +6322,9 @@
           <a:p>
             <a:pPr algn="ctr"/>
             <a:r>
-              <a:rPr lang="nl-NL" dirty="0" smtClean="0"/>
+              <a:rPr lang="nl-NL" dirty="0"/>
               <a:t>Database A</a:t>
             </a:r>
-            <a:endParaRPr lang="nl-NL" dirty="0"/>
           </a:p>
         </p:txBody>
       </p:sp>
@@ -6405,10 +6365,9 @@
           <a:p>
             <a:pPr algn="ctr"/>
             <a:r>
-              <a:rPr lang="nl-NL" dirty="0" smtClean="0"/>
+              <a:rPr lang="nl-NL" dirty="0"/>
               <a:t>Database C</a:t>
             </a:r>
-            <a:endParaRPr lang="nl-NL" dirty="0"/>
           </a:p>
         </p:txBody>
       </p:sp>
@@ -6452,10 +6411,9 @@
           <a:p>
             <a:pPr algn="ctr"/>
             <a:r>
-              <a:rPr lang="nl-NL" dirty="0" smtClean="0"/>
+              <a:rPr lang="nl-NL" dirty="0"/>
               <a:t>schema</a:t>
             </a:r>
-            <a:endParaRPr lang="nl-NL" dirty="0"/>
           </a:p>
         </p:txBody>
       </p:sp>
@@ -6671,14 +6629,13 @@
           <a:p>
             <a:pPr algn="ctr"/>
             <a:r>
-              <a:rPr lang="nl-NL" dirty="0" err="1" smtClean="0"/>
+              <a:rPr lang="nl-NL" dirty="0" err="1"/>
               <a:t>Table</a:t>
             </a:r>
             <a:r>
-              <a:rPr lang="nl-NL" dirty="0" smtClean="0"/>
+              <a:rPr lang="nl-NL" dirty="0"/>
               <a:t> B</a:t>
             </a:r>
-            <a:endParaRPr lang="nl-NL" dirty="0"/>
           </a:p>
         </p:txBody>
       </p:sp>
@@ -6717,10 +6674,9 @@
           <a:p>
             <a:pPr algn="ctr"/>
             <a:r>
-              <a:rPr lang="nl-NL" dirty="0" smtClean="0"/>
+              <a:rPr lang="nl-NL" dirty="0"/>
               <a:t>View C</a:t>
             </a:r>
-            <a:endParaRPr lang="nl-NL" dirty="0"/>
           </a:p>
         </p:txBody>
       </p:sp>
@@ -6874,7 +6830,7 @@
           <a:p>
             <a:pPr algn="ctr"/>
             <a:r>
-              <a:rPr lang="nl-NL" dirty="0" err="1" smtClean="0">
+              <a:rPr lang="nl-NL" dirty="0" err="1">
                 <a:solidFill>
                   <a:srgbClr val="FF0000"/>
                 </a:solidFill>
@@ -6882,7 +6838,7 @@
               <a:t>Properties</a:t>
             </a:r>
             <a:r>
-              <a:rPr lang="nl-NL" dirty="0" smtClean="0">
+              <a:rPr lang="nl-NL" dirty="0">
                 <a:solidFill>
                   <a:srgbClr val="FF0000"/>
                 </a:solidFill>
@@ -6890,7 +6846,7 @@
               <a:t> (</a:t>
             </a:r>
             <a:r>
-              <a:rPr lang="nl-NL" dirty="0" err="1" smtClean="0">
+              <a:rPr lang="nl-NL" dirty="0" err="1">
                 <a:solidFill>
                   <a:srgbClr val="FF0000"/>
                 </a:solidFill>
@@ -6898,7 +6854,7 @@
               <a:t>def.Prop</a:t>
             </a:r>
             <a:r>
-              <a:rPr lang="nl-NL" dirty="0" smtClean="0">
+              <a:rPr lang="nl-NL" dirty="0">
                 <a:solidFill>
                   <a:srgbClr val="FF0000"/>
                 </a:solidFill>
@@ -6906,7 +6862,7 @@
               <a:t>_</a:t>
             </a:r>
             <a:r>
-              <a:rPr lang="nl-NL" dirty="0" err="1" smtClean="0">
+              <a:rPr lang="nl-NL" dirty="0" err="1">
                 <a:solidFill>
                   <a:srgbClr val="FF0000"/>
                 </a:solidFill>
@@ -6914,18 +6870,13 @@
               <a:t>ext</a:t>
             </a:r>
             <a:r>
-              <a:rPr lang="nl-NL" dirty="0" smtClean="0">
+              <a:rPr lang="nl-NL" dirty="0">
                 <a:solidFill>
                   <a:srgbClr val="FF0000"/>
                 </a:solidFill>
               </a:rPr>
               <a:t>)</a:t>
             </a:r>
-            <a:endParaRPr lang="nl-NL" dirty="0">
-              <a:solidFill>
-                <a:srgbClr val="FF0000"/>
-              </a:solidFill>
-            </a:endParaRPr>
           </a:p>
         </p:txBody>
       </p:sp>
@@ -6971,11 +6922,11 @@
           <a:p>
             <a:pPr algn="ctr"/>
             <a:r>
-              <a:rPr lang="nl-NL" dirty="0" smtClean="0"/>
+              <a:rPr lang="nl-NL" dirty="0"/>
               <a:t>Target_schema_</a:t>
             </a:r>
             <a:r>
-              <a:rPr lang="nl-NL" dirty="0" err="1" smtClean="0"/>
+              <a:rPr lang="nl-NL" dirty="0" err="1"/>
               <a:t>id</a:t>
             </a:r>
             <a:endParaRPr lang="nl-NL" dirty="0"/>
@@ -7024,15 +6975,15 @@
           <a:p>
             <a:pPr algn="ctr"/>
             <a:r>
-              <a:rPr lang="nl-NL" dirty="0" err="1" smtClean="0"/>
+              <a:rPr lang="nl-NL" dirty="0" err="1"/>
               <a:t>template</a:t>
             </a:r>
             <a:r>
-              <a:rPr lang="nl-NL" dirty="0" smtClean="0"/>
+              <a:rPr lang="nl-NL" dirty="0"/>
               <a:t>_</a:t>
             </a:r>
             <a:r>
-              <a:rPr lang="nl-NL" dirty="0" err="1" smtClean="0"/>
+              <a:rPr lang="nl-NL" dirty="0" err="1"/>
               <a:t>id</a:t>
             </a:r>
             <a:endParaRPr lang="nl-NL" dirty="0"/>
@@ -7081,14 +7032,13 @@
           <a:p>
             <a:pPr algn="ctr"/>
             <a:r>
-              <a:rPr lang="nl-NL" dirty="0" err="1" smtClean="0"/>
+              <a:rPr lang="nl-NL" dirty="0" err="1"/>
               <a:t>recreate</a:t>
             </a:r>
             <a:r>
-              <a:rPr lang="nl-NL" dirty="0" smtClean="0"/>
+              <a:rPr lang="nl-NL" dirty="0"/>
               <a:t>_tables</a:t>
             </a:r>
-            <a:endParaRPr lang="nl-NL" dirty="0"/>
           </a:p>
         </p:txBody>
       </p:sp>
@@ -7119,18 +7069,18 @@
               <a:buChar char="•"/>
             </a:pPr>
             <a:r>
-              <a:rPr lang="nl-NL" dirty="0" err="1" smtClean="0"/>
+              <a:rPr lang="nl-NL" dirty="0" err="1"/>
               <a:t>default</a:t>
             </a:r>
             <a:r>
-              <a:rPr lang="nl-NL" dirty="0" smtClean="0"/>
+              <a:rPr lang="nl-NL" dirty="0"/>
               <a:t>_</a:t>
             </a:r>
             <a:r>
-              <a:rPr lang="nl-NL" dirty="0" err="1" smtClean="0"/>
+              <a:rPr lang="nl-NL" dirty="0" err="1"/>
               <a:t>value</a:t>
             </a:r>
-            <a:endParaRPr lang="nl-NL" dirty="0" smtClean="0"/>
+            <a:endParaRPr lang="nl-NL" dirty="0"/>
           </a:p>
           <a:p>
             <a:pPr>
@@ -7138,11 +7088,11 @@
               <a:buChar char="•"/>
             </a:pPr>
             <a:r>
-              <a:rPr lang="nl-NL" dirty="0" err="1" smtClean="0"/>
+              <a:rPr lang="nl-NL" dirty="0" err="1"/>
               <a:t>apply</a:t>
             </a:r>
             <a:r>
-              <a:rPr lang="nl-NL" dirty="0" smtClean="0"/>
+              <a:rPr lang="nl-NL" dirty="0"/>
               <a:t>_schema</a:t>
             </a:r>
           </a:p>
@@ -7152,18 +7102,18 @@
               <a:buChar char="•"/>
             </a:pPr>
             <a:r>
-              <a:rPr lang="nl-NL" dirty="0" err="1" smtClean="0"/>
+              <a:rPr lang="nl-NL" dirty="0" err="1"/>
               <a:t>aply</a:t>
             </a:r>
             <a:r>
-              <a:rPr lang="nl-NL" dirty="0" smtClean="0"/>
+              <a:rPr lang="nl-NL" dirty="0"/>
               <a:t>_</a:t>
             </a:r>
             <a:r>
-              <a:rPr lang="nl-NL" dirty="0" err="1" smtClean="0"/>
+              <a:rPr lang="nl-NL" dirty="0" err="1"/>
               <a:t>table</a:t>
             </a:r>
-            <a:endParaRPr lang="nl-NL" dirty="0" smtClean="0"/>
+            <a:endParaRPr lang="nl-NL" dirty="0"/>
           </a:p>
           <a:p>
             <a:pPr>
@@ -7171,7 +7121,7 @@
               <a:buChar char="•"/>
             </a:pPr>
             <a:r>
-              <a:rPr lang="nl-NL" dirty="0" smtClean="0"/>
+              <a:rPr lang="nl-NL" dirty="0"/>
               <a:t>…</a:t>
             </a:r>
           </a:p>
@@ -7181,11 +7131,11 @@
               <a:buChar char="•"/>
             </a:pPr>
             <a:r>
-              <a:rPr lang="nl-NL" dirty="0" err="1" smtClean="0"/>
+              <a:rPr lang="nl-NL" dirty="0" err="1"/>
               <a:t>apply</a:t>
             </a:r>
             <a:r>
-              <a:rPr lang="nl-NL" dirty="0" smtClean="0"/>
+              <a:rPr lang="nl-NL" dirty="0"/>
               <a:t>_user</a:t>
             </a:r>
           </a:p>
@@ -7194,94 +7144,94 @@
               <a:buFont typeface="Arial" charset="0"/>
               <a:buChar char="•"/>
             </a:pPr>
-            <a:endParaRPr lang="nl-NL" dirty="0" smtClean="0"/>
-          </a:p>
-          <a:p>
-            <a:r>
-              <a:rPr lang="nl-NL" dirty="0" err="1" smtClean="0"/>
+            <a:endParaRPr lang="nl-NL" dirty="0"/>
+          </a:p>
+          <a:p>
+            <a:r>
+              <a:rPr lang="nl-NL" dirty="0" err="1"/>
               <a:t>exec</a:t>
             </a:r>
             <a:r>
-              <a:rPr lang="nl-NL" dirty="0" smtClean="0"/>
+              <a:rPr lang="nl-NL" dirty="0"/>
               <a:t> </a:t>
             </a:r>
             <a:r>
-              <a:rPr lang="nl-NL" dirty="0" err="1" smtClean="0"/>
+              <a:rPr lang="nl-NL" dirty="0" err="1"/>
               <a:t>betl.def.set</a:t>
             </a:r>
             <a:r>
-              <a:rPr lang="nl-NL" dirty="0" smtClean="0"/>
+              <a:rPr lang="nl-NL" dirty="0"/>
               <a:t>_p &lt;</a:t>
             </a:r>
             <a:r>
-              <a:rPr lang="nl-NL" dirty="0" err="1" smtClean="0"/>
+              <a:rPr lang="nl-NL" dirty="0" err="1"/>
               <a:t>property</a:t>
             </a:r>
             <a:r>
-              <a:rPr lang="nl-NL" dirty="0" smtClean="0"/>
+              <a:rPr lang="nl-NL" dirty="0"/>
               <a:t>&gt;,&lt;</a:t>
             </a:r>
             <a:r>
-              <a:rPr lang="nl-NL" dirty="0" err="1" smtClean="0"/>
+              <a:rPr lang="nl-NL" dirty="0" err="1"/>
               <a:t>value</a:t>
             </a:r>
             <a:r>
-              <a:rPr lang="nl-NL" dirty="0" smtClean="0"/>
+              <a:rPr lang="nl-NL" dirty="0"/>
               <a:t>&gt;,&lt;</a:t>
             </a:r>
             <a:r>
-              <a:rPr lang="nl-NL" dirty="0" err="1" smtClean="0"/>
+              <a:rPr lang="nl-NL" dirty="0" err="1"/>
               <a:t>obj</a:t>
             </a:r>
             <a:r>
-              <a:rPr lang="nl-NL" dirty="0" smtClean="0"/>
+              <a:rPr lang="nl-NL" dirty="0"/>
               <a:t>_name&gt;</a:t>
             </a:r>
           </a:p>
           <a:p>
             <a:r>
-              <a:rPr lang="nl-NL" dirty="0" err="1" smtClean="0"/>
+              <a:rPr lang="nl-NL" dirty="0" err="1"/>
               <a:t>exec</a:t>
             </a:r>
             <a:r>
-              <a:rPr lang="nl-NL" dirty="0" smtClean="0"/>
+              <a:rPr lang="nl-NL" dirty="0"/>
               <a:t> </a:t>
             </a:r>
             <a:r>
-              <a:rPr lang="nl-NL" dirty="0" err="1" smtClean="0"/>
+              <a:rPr lang="nl-NL" dirty="0" err="1"/>
               <a:t>betl.def.get</a:t>
             </a:r>
             <a:r>
-              <a:rPr lang="nl-NL" dirty="0" smtClean="0"/>
+              <a:rPr lang="nl-NL" dirty="0"/>
               <a:t>_p &lt;</a:t>
             </a:r>
             <a:r>
-              <a:rPr lang="nl-NL" dirty="0" err="1" smtClean="0"/>
+              <a:rPr lang="nl-NL" dirty="0" err="1"/>
               <a:t>property</a:t>
             </a:r>
             <a:r>
-              <a:rPr lang="nl-NL" dirty="0" smtClean="0"/>
+              <a:rPr lang="nl-NL" dirty="0"/>
               <a:t>&gt;,&lt;</a:t>
             </a:r>
             <a:r>
-              <a:rPr lang="nl-NL" dirty="0" err="1" smtClean="0"/>
+              <a:rPr lang="nl-NL" dirty="0" err="1"/>
               <a:t>value</a:t>
             </a:r>
             <a:r>
-              <a:rPr lang="nl-NL" dirty="0" smtClean="0"/>
+              <a:rPr lang="nl-NL" dirty="0"/>
               <a:t>&gt;,&lt;</a:t>
             </a:r>
             <a:r>
-              <a:rPr lang="nl-NL" dirty="0" err="1" smtClean="0"/>
+              <a:rPr lang="nl-NL" dirty="0" err="1"/>
               <a:t>obj</a:t>
             </a:r>
             <a:r>
-              <a:rPr lang="nl-NL" dirty="0" smtClean="0"/>
+              <a:rPr lang="nl-NL" dirty="0"/>
               <a:t>_name&gt;</a:t>
             </a:r>
           </a:p>
           <a:p>
-            <a:endParaRPr lang="nl-NL" dirty="0" smtClean="0"/>
+            <a:endParaRPr lang="nl-NL" dirty="0"/>
           </a:p>
           <a:p>
             <a:endParaRPr lang="nl-NL" dirty="0"/>
@@ -7331,7 +7281,7 @@
           <a:p>
             <a:pPr algn="ctr"/>
             <a:r>
-              <a:rPr lang="nl-NL" dirty="0" err="1" smtClean="0">
+              <a:rPr lang="nl-NL" dirty="0" err="1">
                 <a:solidFill>
                   <a:srgbClr val="FF0000"/>
                 </a:solidFill>
@@ -7339,7 +7289,7 @@
               <a:t>Users</a:t>
             </a:r>
             <a:r>
-              <a:rPr lang="nl-NL" dirty="0" smtClean="0">
+              <a:rPr lang="nl-NL" dirty="0">
                 <a:solidFill>
                   <a:srgbClr val="FF0000"/>
                 </a:solidFill>
@@ -7347,7 +7297,7 @@
               <a:t> (</a:t>
             </a:r>
             <a:r>
-              <a:rPr lang="nl-NL" dirty="0" err="1" smtClean="0">
+              <a:rPr lang="nl-NL" dirty="0" err="1">
                 <a:solidFill>
                   <a:srgbClr val="FF0000"/>
                 </a:solidFill>
@@ -7355,7 +7305,7 @@
               <a:t>def.Obj</a:t>
             </a:r>
             <a:r>
-              <a:rPr lang="nl-NL" dirty="0" smtClean="0">
+              <a:rPr lang="nl-NL" dirty="0">
                 <a:solidFill>
                   <a:srgbClr val="FF0000"/>
                 </a:solidFill>
@@ -7363,7 +7313,7 @@
               <a:t>_</a:t>
             </a:r>
             <a:r>
-              <a:rPr lang="nl-NL" dirty="0" err="1" smtClean="0">
+              <a:rPr lang="nl-NL" dirty="0" err="1">
                 <a:solidFill>
                   <a:srgbClr val="FF0000"/>
                 </a:solidFill>
@@ -7371,18 +7321,13 @@
               <a:t>ext</a:t>
             </a:r>
             <a:r>
-              <a:rPr lang="nl-NL" dirty="0" smtClean="0">
+              <a:rPr lang="nl-NL" dirty="0">
                 <a:solidFill>
                   <a:srgbClr val="FF0000"/>
                 </a:solidFill>
               </a:rPr>
               <a:t>)</a:t>
             </a:r>
-            <a:endParaRPr lang="nl-NL" dirty="0">
-              <a:solidFill>
-                <a:srgbClr val="FF0000"/>
-              </a:solidFill>
-            </a:endParaRPr>
           </a:p>
         </p:txBody>
       </p:sp>
@@ -7423,18 +7368,13 @@
           <a:p>
             <a:pPr algn="ctr"/>
             <a:r>
-              <a:rPr lang="nl-NL" sz="1400" dirty="0" smtClean="0">
+              <a:rPr lang="nl-NL" sz="1400" dirty="0">
                 <a:solidFill>
                   <a:schemeClr val="bg1"/>
                 </a:solidFill>
               </a:rPr>
               <a:t>User B</a:t>
             </a:r>
-            <a:endParaRPr lang="nl-NL" sz="1400" dirty="0">
-              <a:solidFill>
-                <a:schemeClr val="bg1"/>
-              </a:solidFill>
-            </a:endParaRPr>
           </a:p>
         </p:txBody>
       </p:sp>
@@ -7475,18 +7415,13 @@
           <a:p>
             <a:pPr algn="ctr"/>
             <a:r>
-              <a:rPr lang="nl-NL" sz="1400" dirty="0" smtClean="0">
+              <a:rPr lang="nl-NL" sz="1400" dirty="0">
                 <a:solidFill>
                   <a:schemeClr val="bg1"/>
                 </a:solidFill>
               </a:rPr>
               <a:t>User A</a:t>
             </a:r>
-            <a:endParaRPr lang="nl-NL" sz="1400" dirty="0">
-              <a:solidFill>
-                <a:schemeClr val="bg1"/>
-              </a:solidFill>
-            </a:endParaRPr>
           </a:p>
         </p:txBody>
       </p:sp>
@@ -7604,10 +7539,9 @@
           <a:p>
             <a:pPr algn="ctr"/>
             <a:r>
-              <a:rPr lang="nl-NL" dirty="0" smtClean="0"/>
+              <a:rPr lang="nl-NL" dirty="0"/>
               <a:t>log_level</a:t>
             </a:r>
-            <a:endParaRPr lang="nl-NL" dirty="0"/>
           </a:p>
         </p:txBody>
       </p:sp>
@@ -7653,14 +7587,13 @@
           <a:p>
             <a:pPr algn="ctr"/>
             <a:r>
-              <a:rPr lang="nl-NL" dirty="0" err="1" smtClean="0"/>
+              <a:rPr lang="nl-NL" dirty="0" err="1"/>
               <a:t>etc</a:t>
             </a:r>
             <a:r>
-              <a:rPr lang="nl-NL" dirty="0" smtClean="0"/>
+              <a:rPr lang="nl-NL" dirty="0"/>
               <a:t>…</a:t>
             </a:r>
-            <a:endParaRPr lang="nl-NL" dirty="0"/>
           </a:p>
         </p:txBody>
       </p:sp>
@@ -7741,11 +7674,11 @@
           <a:p>
             <a:pPr algn="ctr"/>
             <a:r>
-              <a:rPr lang="nl-NL" dirty="0" smtClean="0"/>
+              <a:rPr lang="nl-NL" dirty="0"/>
               <a:t>transfer_</a:t>
             </a:r>
             <a:r>
-              <a:rPr lang="nl-NL" dirty="0" err="1" smtClean="0"/>
+              <a:rPr lang="nl-NL" dirty="0" err="1"/>
               <a:t>id</a:t>
             </a:r>
             <a:endParaRPr lang="nl-NL" dirty="0"/>
@@ -7852,10 +7785,9 @@
           <a:p>
             <a:pPr algn="ctr"/>
             <a:r>
-              <a:rPr lang="nl-NL" dirty="0" err="1" smtClean="0"/>
-              <a:t>dbo</a:t>
-            </a:r>
-            <a:endParaRPr lang="nl-NL" dirty="0"/>
+              <a:rPr lang="nl-NL" dirty="0"/>
+              <a:t>AW</a:t>
+            </a:r>
           </a:p>
         </p:txBody>
       </p:sp>
@@ -7899,7 +7831,7 @@
           <a:p>
             <a:pPr algn="ctr"/>
             <a:r>
-              <a:rPr lang="nl-NL" dirty="0" err="1" smtClean="0"/>
+              <a:rPr lang="nl-NL" dirty="0" err="1"/>
               <a:t>Production</a:t>
             </a:r>
             <a:endParaRPr lang="nl-NL" dirty="0"/>
@@ -7941,10 +7873,9 @@
           <a:p>
             <a:pPr algn="ctr"/>
             <a:r>
-              <a:rPr lang="nl-NL" dirty="0" smtClean="0"/>
+              <a:rPr lang="nl-NL" dirty="0"/>
               <a:t>Product</a:t>
             </a:r>
-            <a:endParaRPr lang="nl-NL" dirty="0"/>
           </a:p>
         </p:txBody>
       </p:sp>
@@ -7985,10 +7916,9 @@
           <a:p>
             <a:pPr algn="ctr"/>
             <a:r>
-              <a:rPr lang="nl-NL" dirty="0" smtClean="0"/>
-              <a:t>AdventureWorks2014</a:t>
-            </a:r>
-            <a:endParaRPr lang="nl-NL" dirty="0"/>
+              <a:rPr lang="nl-NL" dirty="0"/>
+              <a:t>AdventureWorks2017</a:t>
+            </a:r>
           </a:p>
         </p:txBody>
       </p:sp>
@@ -8029,7 +7959,7 @@
           <a:p>
             <a:pPr algn="ctr"/>
             <a:r>
-              <a:rPr lang="nl-NL" dirty="0" err="1" smtClean="0"/>
+              <a:rPr lang="nl-NL" dirty="0" err="1"/>
               <a:t>localhost</a:t>
             </a:r>
             <a:endParaRPr lang="nl-NL" dirty="0"/>
@@ -8071,10 +8001,9 @@
           <a:p>
             <a:pPr algn="ctr"/>
             <a:r>
-              <a:rPr lang="nl-NL" dirty="0" smtClean="0"/>
+              <a:rPr lang="nl-NL" dirty="0"/>
               <a:t>Product</a:t>
             </a:r>
-            <a:endParaRPr lang="nl-NL" dirty="0"/>
           </a:p>
         </p:txBody>
       </p:sp>
@@ -8115,11 +8044,11 @@
           <a:p>
             <a:pPr algn="ctr"/>
             <a:r>
-              <a:rPr lang="nl-NL" dirty="0" smtClean="0"/>
+              <a:rPr lang="nl-NL" dirty="0"/>
               <a:t>My_</a:t>
             </a:r>
             <a:r>
-              <a:rPr lang="nl-NL" dirty="0" err="1" smtClean="0"/>
+              <a:rPr lang="nl-NL" dirty="0" err="1"/>
               <a:t>Staging</a:t>
             </a:r>
             <a:endParaRPr lang="nl-NL" dirty="0"/>
@@ -8163,7 +8092,7 @@
           <a:p>
             <a:pPr algn="ctr"/>
             <a:r>
-              <a:rPr lang="nl-NL" dirty="0" err="1" smtClean="0"/>
+              <a:rPr lang="nl-NL" dirty="0" err="1"/>
               <a:t>localhost</a:t>
             </a:r>
             <a:endParaRPr lang="nl-NL" dirty="0"/>
@@ -8218,7 +8147,7 @@
           <a:blip r:embed="rId2" cstate="print">
             <a:extLst>
               <a:ext uri="{28A0092B-C50C-407E-A947-70E740481C1C}">
-                <a14:useLocalDpi xmlns:a14="http://schemas.microsoft.com/office/drawing/2010/main" xmlns="" val="0"/>
+                <a14:useLocalDpi xmlns:a14="http://schemas.microsoft.com/office/drawing/2010/main" val="0"/>
               </a:ext>
             </a:extLst>
           </a:blip>
@@ -8238,7 +8167,7 @@
           <a:noFill/>
           <a:extLst>
             <a:ext uri="{909E8E84-426E-40DD-AFC4-6F175D3DCCD1}">
-              <a14:hiddenFill xmlns:a14="http://schemas.microsoft.com/office/drawing/2010/main" xmlns="">
+              <a14:hiddenFill xmlns:a14="http://schemas.microsoft.com/office/drawing/2010/main">
                 <a:solidFill>
                   <a:srgbClr val="FFFFFF"/>
                 </a:solidFill>
@@ -8270,7 +8199,7 @@
           <a:lstStyle/>
           <a:p>
             <a:r>
-              <a:rPr lang="en-US" dirty="0" smtClean="0"/>
+              <a:rPr lang="en-US" dirty="0"/>
               <a:t>BETL</a:t>
             </a:r>
             <a:endParaRPr lang="nl-NL" dirty="0"/>
@@ -8300,22 +8229,21 @@
           <a:lstStyle/>
           <a:p>
             <a:r>
-              <a:rPr lang="nl-NL" dirty="0" err="1" smtClean="0"/>
+              <a:rPr lang="nl-NL" dirty="0" err="1"/>
               <a:t>exec</a:t>
             </a:r>
             <a:r>
-              <a:rPr lang="nl-NL" dirty="0" smtClean="0"/>
+              <a:rPr lang="nl-NL" dirty="0"/>
               <a:t> </a:t>
             </a:r>
             <a:r>
-              <a:rPr lang="nl-NL" dirty="0" err="1" smtClean="0"/>
+              <a:rPr lang="nl-NL" dirty="0" err="1"/>
               <a:t>betl.dbo.push</a:t>
             </a:r>
             <a:r>
-              <a:rPr lang="nl-NL" dirty="0" smtClean="0"/>
-              <a:t> ‘AdventureWorks2014.Production.Product’</a:t>
-            </a:r>
-            <a:endParaRPr lang="nl-NL" dirty="0"/>
+              <a:rPr lang="nl-NL" dirty="0"/>
+              <a:t> ‘AdventureWorks2017.Production.Product’</a:t>
+            </a:r>
           </a:p>
         </p:txBody>
       </p:sp>
@@ -8582,7 +8510,7 @@
   <a:extraClrSchemeLst/>
   <a:extLst>
     <a:ext uri="{05A4C25C-085E-4340-85A3-A5531E510DB2}">
-      <thm15:themeFamily xmlns:thm15="http://schemas.microsoft.com/office/thememl/2012/main" xmlns="" name="Office Theme" id="{62F939B6-93AF-4DB8-9C6B-D6C7DFDC589F}" vid="{4A3C46E8-61CC-4603-A589-7422A47A8E4A}"/>
+      <thm15:themeFamily xmlns:thm15="http://schemas.microsoft.com/office/thememl/2012/main" name="Office Theme" id="{62F939B6-93AF-4DB8-9C6B-D6C7DFDC589F}" vid="{4A3C46E8-61CC-4603-A589-7422A47A8E4A}"/>
     </a:ext>
   </a:extLst>
 </a:theme>
@@ -8843,7 +8771,7 @@
   <a:extraClrSchemeLst/>
   <a:extLst>
     <a:ext uri="{05A4C25C-085E-4340-85A3-A5531E510DB2}">
-      <thm15:themeFamily xmlns:thm15="http://schemas.microsoft.com/office/thememl/2012/main" xmlns="" name="Office Theme" id="{62F939B6-93AF-4DB8-9C6B-D6C7DFDC589F}" vid="{4A3C46E8-61CC-4603-A589-7422A47A8E4A}"/>
+      <thm15:themeFamily xmlns:thm15="http://schemas.microsoft.com/office/thememl/2012/main" name="Office Theme" id="{62F939B6-93AF-4DB8-9C6B-D6C7DFDC589F}" vid="{4A3C46E8-61CC-4603-A589-7422A47A8E4A}"/>
     </a:ext>
   </a:extLst>
 </a:theme>

</xml_diff>